<commit_message>
Rerun deploy-model with best model, update bar chart and PPTX.
</commit_message>
<xml_diff>
--- a/docs/dlqa-workshop-2016.pptx
+++ b/docs/dlqa-workshop-2016.pptx
@@ -238,7 +238,7 @@
           <a:p>
             <a:fld id="{63DED69B-0789-5149-83AE-54AA1D4BCC0E}" type="datetimeFigureOut">
               <a:rPr lang="en-US" smtClean="0"/>
-              <a:t>10/7/16</a:t>
+              <a:t>10/8/16</a:t>
             </a:fld>
             <a:endParaRPr lang="en-US"/>
           </a:p>
@@ -404,7 +404,7 @@
           <a:p>
             <a:fld id="{C957013A-9526-8E4A-AF20-1B429AB6AD9B}" type="datetimeFigureOut">
               <a:rPr lang="en-US" smtClean="0"/>
-              <a:t>10/7/16</a:t>
+              <a:t>10/8/16</a:t>
             </a:fld>
             <a:endParaRPr lang="en-US"/>
           </a:p>
@@ -2096,7 +2096,7 @@
           <a:p>
             <a:fld id="{7ACCED64-6508-C843-B177-5E0048785ADC}" type="datetime1">
               <a:rPr lang="en-US" smtClean="0"/>
-              <a:t>10/7/16</a:t>
+              <a:t>10/8/16</a:t>
             </a:fld>
             <a:endParaRPr lang="en-US"/>
           </a:p>
@@ -2296,7 +2296,7 @@
           <a:p>
             <a:fld id="{51B0BD8F-9BD7-AB41-BAC3-D5B18D46E046}" type="datetime1">
               <a:rPr lang="en-US" smtClean="0"/>
-              <a:t>10/7/16</a:t>
+              <a:t>10/8/16</a:t>
             </a:fld>
             <a:endParaRPr lang="en-US"/>
           </a:p>
@@ -2471,7 +2471,7 @@
           <a:p>
             <a:fld id="{A3CFB5C4-8EDB-A74D-954D-90F01E5A48E8}" type="datetime1">
               <a:rPr lang="en-US" smtClean="0"/>
-              <a:t>10/7/16</a:t>
+              <a:t>10/8/16</a:t>
             </a:fld>
             <a:endParaRPr lang="en-US"/>
           </a:p>
@@ -2636,7 +2636,7 @@
           <a:p>
             <a:fld id="{C910CEC3-A28D-3746-BC6D-3460ED2ACBC1}" type="datetime1">
               <a:rPr lang="en-US" smtClean="0"/>
-              <a:t>10/7/16</a:t>
+              <a:t>10/8/16</a:t>
             </a:fld>
             <a:endParaRPr lang="en-US"/>
           </a:p>
@@ -2884,7 +2884,7 @@
           <a:p>
             <a:fld id="{1D9AF845-3773-3745-847C-5B9CB98D9C16}" type="datetime1">
               <a:rPr lang="en-US" smtClean="0"/>
-              <a:t>10/7/16</a:t>
+              <a:t>10/8/16</a:t>
             </a:fld>
             <a:endParaRPr lang="en-US"/>
           </a:p>
@@ -3202,7 +3202,7 @@
           <a:p>
             <a:fld id="{8513203C-94D7-914C-9AA2-5C0019494440}" type="datetime1">
               <a:rPr lang="en-US" smtClean="0"/>
-              <a:t>10/7/16</a:t>
+              <a:t>10/8/16</a:t>
             </a:fld>
             <a:endParaRPr lang="en-US"/>
           </a:p>
@@ -3668,7 +3668,7 @@
           <a:p>
             <a:fld id="{E4499E5B-A03A-3E40-9DD9-EB57D12A5FB4}" type="datetime1">
               <a:rPr lang="en-US" smtClean="0"/>
-              <a:t>10/7/16</a:t>
+              <a:t>10/8/16</a:t>
             </a:fld>
             <a:endParaRPr lang="en-US"/>
           </a:p>
@@ -3816,7 +3816,7 @@
           <a:p>
             <a:fld id="{A7F250E5-A701-3D43-A83E-5946A58FB71E}" type="datetime1">
               <a:rPr lang="en-US" smtClean="0"/>
-              <a:t>10/7/16</a:t>
+              <a:t>10/8/16</a:t>
             </a:fld>
             <a:endParaRPr lang="en-US"/>
           </a:p>
@@ -3906,7 +3906,7 @@
           <a:p>
             <a:fld id="{BFFCB470-FC62-0C48-A1E6-3635749CE9A4}" type="datetime1">
               <a:rPr lang="en-US" smtClean="0"/>
-              <a:t>10/7/16</a:t>
+              <a:t>10/8/16</a:t>
             </a:fld>
             <a:endParaRPr lang="en-US"/>
           </a:p>
@@ -4180,7 +4180,7 @@
           <a:p>
             <a:fld id="{0D2778B1-42D1-8647-9547-6FFE0BBB0A66}" type="datetime1">
               <a:rPr lang="en-US" smtClean="0"/>
-              <a:t>10/7/16</a:t>
+              <a:t>10/8/16</a:t>
             </a:fld>
             <a:endParaRPr lang="en-US"/>
           </a:p>
@@ -4485,7 +4485,7 @@
           <a:p>
             <a:fld id="{E43B9EF5-CB6B-ED4A-9543-D872AEB61D7E}" type="datetime1">
               <a:rPr lang="en-US" smtClean="0"/>
-              <a:t>10/7/16</a:t>
+              <a:t>10/8/16</a:t>
             </a:fld>
             <a:endParaRPr lang="en-US"/>
           </a:p>
@@ -4783,7 +4783,7 @@
           <a:p>
             <a:fld id="{0008CD8D-3B90-F444-A5ED-89AD4469763E}" type="datetime1">
               <a:rPr lang="en-US" smtClean="0"/>
-              <a:t>10/7/16</a:t>
+              <a:t>10/8/16</a:t>
             </a:fld>
             <a:endParaRPr lang="en-US"/>
           </a:p>
@@ -15636,7 +15636,7 @@
       </p:sp>
       <p:pic>
         <p:nvPicPr>
-          <p:cNvPr id="2" name="Content Placeholder 1" descr="deploy.png"/>
+          <p:cNvPr id="2" name="Content Placeholder 1"/>
           <p:cNvPicPr>
             <a:picLocks noGrp="1" noChangeAspect="1"/>
           </p:cNvPicPr>
@@ -15652,15 +15652,14 @@
               </a:ext>
             </a:extLst>
           </a:blip>
-          <a:srcRect t="-9064" b="-9064"/>
           <a:stretch>
             <a:fillRect/>
           </a:stretch>
         </p:blipFill>
         <p:spPr>
           <a:xfrm>
-            <a:off x="457200" y="1576388"/>
-            <a:ext cx="8229600" cy="4876800"/>
+            <a:off x="457200" y="1611093"/>
+            <a:ext cx="8229600" cy="4807390"/>
           </a:xfrm>
         </p:spPr>
       </p:pic>

</xml_diff>